<commit_message>
Poster updates from M. Barnes
</commit_message>
<xml_diff>
--- a/MKIImpedancePoster/introductionPicture.pptx
+++ b/MKIImpedancePoster/introductionPicture.pptx
@@ -192,7 +192,7 @@
           <a:p>
             <a:fld id="{09973353-A222-4BB2-9810-F11B29D6B68C}" type="datetimeFigureOut">
               <a:rPr lang="en-GB" smtClean="0"/>
-              <a:t>10/06/2014</a:t>
+              <a:t>11/06/2014</a:t>
             </a:fld>
             <a:endParaRPr lang="en-GB"/>
           </a:p>
@@ -730,7 +730,7 @@
           <a:p>
             <a:fld id="{68AEE693-7654-4C3E-BEAD-B1DD9C3DAA08}" type="datetimeFigureOut">
               <a:rPr lang="en-GB" smtClean="0"/>
-              <a:t>10/06/2014</a:t>
+              <a:t>11/06/2014</a:t>
             </a:fld>
             <a:endParaRPr lang="en-GB"/>
           </a:p>
@@ -900,7 +900,7 @@
           <a:p>
             <a:fld id="{68AEE693-7654-4C3E-BEAD-B1DD9C3DAA08}" type="datetimeFigureOut">
               <a:rPr lang="en-GB" smtClean="0"/>
-              <a:t>10/06/2014</a:t>
+              <a:t>11/06/2014</a:t>
             </a:fld>
             <a:endParaRPr lang="en-GB"/>
           </a:p>
@@ -1080,7 +1080,7 @@
           <a:p>
             <a:fld id="{68AEE693-7654-4C3E-BEAD-B1DD9C3DAA08}" type="datetimeFigureOut">
               <a:rPr lang="en-GB" smtClean="0"/>
-              <a:t>10/06/2014</a:t>
+              <a:t>11/06/2014</a:t>
             </a:fld>
             <a:endParaRPr lang="en-GB"/>
           </a:p>
@@ -1250,7 +1250,7 @@
           <a:p>
             <a:fld id="{68AEE693-7654-4C3E-BEAD-B1DD9C3DAA08}" type="datetimeFigureOut">
               <a:rPr lang="en-GB" smtClean="0"/>
-              <a:t>10/06/2014</a:t>
+              <a:t>11/06/2014</a:t>
             </a:fld>
             <a:endParaRPr lang="en-GB"/>
           </a:p>
@@ -1496,7 +1496,7 @@
           <a:p>
             <a:fld id="{68AEE693-7654-4C3E-BEAD-B1DD9C3DAA08}" type="datetimeFigureOut">
               <a:rPr lang="en-GB" smtClean="0"/>
-              <a:t>10/06/2014</a:t>
+              <a:t>11/06/2014</a:t>
             </a:fld>
             <a:endParaRPr lang="en-GB"/>
           </a:p>
@@ -1784,7 +1784,7 @@
           <a:p>
             <a:fld id="{68AEE693-7654-4C3E-BEAD-B1DD9C3DAA08}" type="datetimeFigureOut">
               <a:rPr lang="en-GB" smtClean="0"/>
-              <a:t>10/06/2014</a:t>
+              <a:t>11/06/2014</a:t>
             </a:fld>
             <a:endParaRPr lang="en-GB"/>
           </a:p>
@@ -2211,7 +2211,7 @@
           <a:p>
             <a:fld id="{68AEE693-7654-4C3E-BEAD-B1DD9C3DAA08}" type="datetimeFigureOut">
               <a:rPr lang="en-GB" smtClean="0"/>
-              <a:t>10/06/2014</a:t>
+              <a:t>11/06/2014</a:t>
             </a:fld>
             <a:endParaRPr lang="en-GB"/>
           </a:p>
@@ -2329,7 +2329,7 @@
           <a:p>
             <a:fld id="{68AEE693-7654-4C3E-BEAD-B1DD9C3DAA08}" type="datetimeFigureOut">
               <a:rPr lang="en-GB" smtClean="0"/>
-              <a:t>10/06/2014</a:t>
+              <a:t>11/06/2014</a:t>
             </a:fld>
             <a:endParaRPr lang="en-GB"/>
           </a:p>
@@ -2424,7 +2424,7 @@
           <a:p>
             <a:fld id="{68AEE693-7654-4C3E-BEAD-B1DD9C3DAA08}" type="datetimeFigureOut">
               <a:rPr lang="en-GB" smtClean="0"/>
-              <a:t>10/06/2014</a:t>
+              <a:t>11/06/2014</a:t>
             </a:fld>
             <a:endParaRPr lang="en-GB"/>
           </a:p>
@@ -2701,7 +2701,7 @@
           <a:p>
             <a:fld id="{68AEE693-7654-4C3E-BEAD-B1DD9C3DAA08}" type="datetimeFigureOut">
               <a:rPr lang="en-GB" smtClean="0"/>
-              <a:t>10/06/2014</a:t>
+              <a:t>11/06/2014</a:t>
             </a:fld>
             <a:endParaRPr lang="en-GB"/>
           </a:p>
@@ -2954,7 +2954,7 @@
           <a:p>
             <a:fld id="{68AEE693-7654-4C3E-BEAD-B1DD9C3DAA08}" type="datetimeFigureOut">
               <a:rPr lang="en-GB" smtClean="0"/>
-              <a:t>10/06/2014</a:t>
+              <a:t>11/06/2014</a:t>
             </a:fld>
             <a:endParaRPr lang="en-GB"/>
           </a:p>
@@ -3167,7 +3167,7 @@
           <a:p>
             <a:fld id="{68AEE693-7654-4C3E-BEAD-B1DD9C3DAA08}" type="datetimeFigureOut">
               <a:rPr lang="en-GB" smtClean="0"/>
-              <a:t>10/06/2014</a:t>
+              <a:t>11/06/2014</a:t>
             </a:fld>
             <a:endParaRPr lang="en-GB"/>
           </a:p>
@@ -3592,7 +3592,7 @@
         <p:spPr>
           <a:xfrm>
             <a:off x="180107" y="0"/>
-            <a:ext cx="16021918" cy="2400657"/>
+            <a:ext cx="16021918" cy="3508653"/>
           </a:xfrm>
           <a:prstGeom prst="rect">
             <a:avLst/>
@@ -3730,8 +3730,16 @@
               <a:t> </a:t>
             </a:r>
             <a:r>
+              <a:rPr lang="fr-CA" dirty="0" err="1" smtClean="0"/>
+              <a:t>screen</a:t>
+            </a:r>
+            <a:r>
+              <a:rPr lang="fr-CA" dirty="0" smtClean="0"/>
+              <a:t>, </a:t>
+            </a:r>
+            <a:r>
               <a:rPr lang="fr-CA" dirty="0" err="1"/>
-              <a:t>screen</a:t>
+              <a:t>inserted</a:t>
             </a:r>
             <a:r>
               <a:rPr lang="fr-CA" dirty="0"/>
@@ -3739,14 +3747,6 @@
             </a:r>
             <a:r>
               <a:rPr lang="fr-CA" dirty="0" err="1"/>
-              <a:t>inserted</a:t>
-            </a:r>
-            <a:r>
-              <a:rPr lang="fr-CA" dirty="0"/>
-              <a:t> </a:t>
-            </a:r>
-            <a:r>
-              <a:rPr lang="fr-CA" dirty="0" err="1"/>
               <a:t>into</a:t>
             </a:r>
             <a:r>
@@ -3754,11 +3754,11 @@
               <a:t> the ferrite </a:t>
             </a:r>
             <a:r>
-              <a:rPr lang="fr-CA" dirty="0" err="1"/>
-              <a:t>yoke</a:t>
-            </a:r>
-            <a:r>
-              <a:rPr lang="fr-CA" dirty="0"/>
+              <a:rPr lang="fr-CA" dirty="0" smtClean="0"/>
+              <a:t>aperture,</a:t>
+            </a:r>
+            <a:r>
+              <a:rPr lang="fr-CA" dirty="0" smtClean="0"/>
               <a:t> </a:t>
             </a:r>
             <a:r>
@@ -3940,11 +3940,7 @@
             </a:r>
             <a:r>
               <a:rPr lang="fr-CA" dirty="0" smtClean="0"/>
-              <a:t> – MKI8D </a:t>
-            </a:r>
-            <a:r>
-              <a:rPr lang="fr-CA" dirty="0" smtClean="0"/>
-              <a:t>(the </a:t>
+              <a:t> – MKI8D (the </a:t>
             </a:r>
             <a:r>
               <a:rPr lang="fr-CA" dirty="0" err="1" smtClean="0"/>
@@ -3963,112 +3959,108 @@
               <a:t> line </a:t>
             </a:r>
             <a:r>
+              <a:rPr lang="fr-CA" dirty="0" err="1" smtClean="0"/>
+              <a:t>above</a:t>
+            </a:r>
+            <a:r>
+              <a:rPr lang="fr-CA" dirty="0" smtClean="0"/>
+              <a:t>). This </a:t>
+            </a:r>
+            <a:r>
+              <a:rPr lang="fr-CA" dirty="0" err="1" smtClean="0"/>
+              <a:t>was</a:t>
+            </a:r>
+            <a:r>
+              <a:rPr lang="fr-CA" dirty="0" smtClean="0"/>
+              <a:t> </a:t>
+            </a:r>
+            <a:r>
+              <a:rPr lang="fr-CA" dirty="0" err="1" smtClean="0"/>
+              <a:t>replaced</a:t>
+            </a:r>
+            <a:r>
+              <a:rPr lang="fr-CA" dirty="0" smtClean="0"/>
+              <a:t> in </a:t>
+            </a:r>
+            <a:r>
+              <a:rPr lang="fr-CA" dirty="0" err="1" smtClean="0"/>
+              <a:t>September</a:t>
+            </a:r>
+            <a:r>
+              <a:rPr lang="fr-CA" dirty="0" smtClean="0"/>
+              <a:t> 2012 </a:t>
+            </a:r>
+            <a:r>
+              <a:rPr lang="fr-CA" dirty="0" err="1" smtClean="0"/>
+              <a:t>during</a:t>
+            </a:r>
+            <a:r>
+              <a:rPr lang="fr-CA" dirty="0" smtClean="0"/>
+              <a:t>, </a:t>
+            </a:r>
+            <a:r>
+              <a:rPr lang="fr-CA" dirty="0" err="1" smtClean="0"/>
+              <a:t>technical</a:t>
+            </a:r>
+            <a:r>
+              <a:rPr lang="fr-CA" dirty="0" smtClean="0"/>
+              <a:t> stop  3 (TS3</a:t>
+            </a:r>
+            <a:r>
+              <a:rPr lang="fr-CA" dirty="0" smtClean="0"/>
+              <a:t>), </a:t>
+            </a:r>
+            <a:r>
+              <a:rPr lang="fr-CA" dirty="0" err="1" smtClean="0"/>
+              <a:t>with</a:t>
+            </a:r>
+            <a:r>
+              <a:rPr lang="fr-CA" dirty="0" smtClean="0"/>
+              <a:t> a </a:t>
+            </a:r>
+            <a:r>
+              <a:rPr lang="fr-CA" dirty="0" err="1" smtClean="0"/>
+              <a:t>beam</a:t>
+            </a:r>
+            <a:r>
+              <a:rPr lang="fr-CA" dirty="0" smtClean="0"/>
+              <a:t> </a:t>
+            </a:r>
+            <a:r>
+              <a:rPr lang="fr-CA" dirty="0" err="1" smtClean="0"/>
+              <a:t>screen</a:t>
+            </a:r>
+            <a:r>
+              <a:rPr lang="fr-CA" dirty="0" smtClean="0"/>
+              <a:t> </a:t>
+            </a:r>
+            <a:r>
+              <a:rPr lang="fr-CA" dirty="0" err="1" smtClean="0"/>
+              <a:t>with</a:t>
+            </a:r>
+            <a:r>
+              <a:rPr lang="fr-CA" dirty="0" smtClean="0"/>
+              <a:t> 19 </a:t>
+            </a:r>
+            <a:r>
+              <a:rPr lang="fr-CA" dirty="0" err="1" smtClean="0"/>
+              <a:t>conductors</a:t>
+            </a:r>
+            <a:r>
+              <a:rPr lang="fr-CA" dirty="0" smtClean="0"/>
+              <a:t> (in the </a:t>
+            </a:r>
+            <a:r>
+              <a:rPr lang="fr-CA" dirty="0" err="1" smtClean="0"/>
+              <a:t>red</a:t>
+            </a:r>
+            <a:r>
+              <a:rPr lang="fr-CA" dirty="0" smtClean="0"/>
+              <a:t> box </a:t>
+            </a:r>
+            <a:r>
               <a:rPr lang="fr-CA" smtClean="0"/>
-              <a:t>above). </a:t>
-            </a:r>
-            <a:r>
-              <a:rPr lang="fr-CA" dirty="0" smtClean="0"/>
-              <a:t>This </a:t>
-            </a:r>
-            <a:r>
-              <a:rPr lang="fr-CA" dirty="0" err="1" smtClean="0"/>
-              <a:t>was</a:t>
-            </a:r>
-            <a:r>
-              <a:rPr lang="fr-CA" dirty="0" smtClean="0"/>
-              <a:t> </a:t>
-            </a:r>
-            <a:r>
-              <a:rPr lang="fr-CA" dirty="0" err="1" smtClean="0"/>
-              <a:t>replaced</a:t>
-            </a:r>
-            <a:r>
-              <a:rPr lang="fr-CA" dirty="0" smtClean="0"/>
-              <a:t> in </a:t>
-            </a:r>
-            <a:r>
-              <a:rPr lang="fr-CA" dirty="0" err="1" smtClean="0"/>
-              <a:t>September</a:t>
-            </a:r>
-            <a:r>
-              <a:rPr lang="fr-CA" dirty="0" smtClean="0"/>
-              <a:t> 2012 </a:t>
-            </a:r>
-            <a:r>
-              <a:rPr lang="fr-CA" dirty="0" err="1" smtClean="0"/>
-              <a:t>during</a:t>
-            </a:r>
-            <a:r>
-              <a:rPr lang="fr-CA" dirty="0" smtClean="0"/>
-              <a:t> a </a:t>
-            </a:r>
-            <a:r>
-              <a:rPr lang="fr-CA" dirty="0" err="1" smtClean="0"/>
-              <a:t>technical</a:t>
-            </a:r>
-            <a:r>
-              <a:rPr lang="fr-CA" dirty="0" smtClean="0"/>
-              <a:t> stop </a:t>
-            </a:r>
-            <a:r>
-              <a:rPr lang="fr-CA" dirty="0" smtClean="0"/>
-              <a:t> 3 (TS3) </a:t>
-            </a:r>
-            <a:r>
-              <a:rPr lang="fr-CA" dirty="0" err="1" smtClean="0"/>
-              <a:t>with</a:t>
-            </a:r>
-            <a:r>
-              <a:rPr lang="fr-CA" dirty="0" smtClean="0"/>
-              <a:t> a </a:t>
-            </a:r>
-            <a:r>
-              <a:rPr lang="fr-CA" dirty="0" err="1" smtClean="0"/>
-              <a:t>beam</a:t>
-            </a:r>
-            <a:r>
-              <a:rPr lang="fr-CA" dirty="0" smtClean="0"/>
-              <a:t> </a:t>
-            </a:r>
-            <a:r>
-              <a:rPr lang="fr-CA" dirty="0" err="1" smtClean="0"/>
-              <a:t>screen</a:t>
-            </a:r>
-            <a:r>
-              <a:rPr lang="fr-CA" dirty="0" smtClean="0"/>
-              <a:t> </a:t>
-            </a:r>
-            <a:r>
-              <a:rPr lang="fr-CA" dirty="0" err="1" smtClean="0"/>
-              <a:t>with</a:t>
-            </a:r>
-            <a:r>
-              <a:rPr lang="fr-CA" dirty="0" smtClean="0"/>
-              <a:t> 19 </a:t>
-            </a:r>
-            <a:r>
-              <a:rPr lang="fr-CA" dirty="0" err="1" smtClean="0"/>
-              <a:t>conductors</a:t>
-            </a:r>
-            <a:r>
-              <a:rPr lang="fr-CA" dirty="0" smtClean="0"/>
-              <a:t> (in the </a:t>
-            </a:r>
-            <a:r>
-              <a:rPr lang="fr-CA" dirty="0" err="1" smtClean="0"/>
-              <a:t>red</a:t>
-            </a:r>
-            <a:r>
-              <a:rPr lang="fr-CA" dirty="0" smtClean="0"/>
-              <a:t> box </a:t>
-            </a:r>
-            <a:r>
-              <a:rPr lang="fr-CA" dirty="0" err="1" smtClean="0"/>
-              <a:t>above</a:t>
-            </a:r>
-            <a:r>
-              <a:rPr lang="fr-CA" dirty="0" smtClean="0"/>
-              <a:t>), </a:t>
+              <a:t>above-left), </a:t>
             </a:r>
             <a:r>
               <a:rPr lang="fr-CA" dirty="0" err="1" smtClean="0"/>
@@ -5953,6 +5945,14 @@
             <a:r>
               <a:rPr lang="fr-CA" dirty="0" smtClean="0"/>
               <a:t> </a:t>
+            </a:r>
+            <a:r>
+              <a:rPr lang="fr-CA" dirty="0" err="1" smtClean="0"/>
+              <a:t>originally</a:t>
+            </a:r>
+            <a:r>
+              <a:rPr lang="fr-CA" dirty="0" smtClean="0"/>
+              <a:t>  </a:t>
             </a:r>
             <a:r>
               <a:rPr lang="fr-CA" dirty="0" err="1" smtClean="0"/>

</xml_diff>